<commit_message>
Fine tuning the UEF protocol
</commit_message>
<xml_diff>
--- a/NI-2010/Drivers/Yokogawa WT300 Series/Documentation/Set IP.pptx
+++ b/NI-2010/Drivers/Yokogawa WT300 Series/Documentation/Set IP.pptx
@@ -140,6 +140,96 @@
       </a:defRPr>
     </a:lvl9pPr>
   </p:defaultTextStyle>
+  <p:extLst>
+    <p:ext uri="{EFAFB233-063F-42B5-8137-9DF3F51BA10A}">
+      <p15:sldGuideLst xmlns:p15="http://schemas.microsoft.com/office/powerpoint/2012/main">
+        <p15:guide id="1" orient="horz" pos="1311">
+          <p15:clr>
+            <a:srgbClr val="A4A3A4"/>
+          </p15:clr>
+        </p15:guide>
+        <p15:guide id="2" orient="horz" pos="3758">
+          <p15:clr>
+            <a:srgbClr val="A4A3A4"/>
+          </p15:clr>
+        </p15:guide>
+        <p15:guide id="3" orient="horz" pos="1062">
+          <p15:clr>
+            <a:srgbClr val="A4A3A4"/>
+          </p15:clr>
+        </p15:guide>
+        <p15:guide id="4" orient="horz" pos="449">
+          <p15:clr>
+            <a:srgbClr val="A4A3A4"/>
+          </p15:clr>
+        </p15:guide>
+        <p15:guide id="5" orient="horz" pos="2849">
+          <p15:clr>
+            <a:srgbClr val="A4A3A4"/>
+          </p15:clr>
+        </p15:guide>
+        <p15:guide id="6" orient="horz" pos="2153">
+          <p15:clr>
+            <a:srgbClr val="A4A3A4"/>
+          </p15:clr>
+        </p15:guide>
+        <p15:guide id="7" orient="horz" pos="5442">
+          <p15:clr>
+            <a:srgbClr val="A4A3A4"/>
+          </p15:clr>
+        </p15:guide>
+        <p15:guide id="8" orient="horz" pos="1954">
+          <p15:clr>
+            <a:srgbClr val="A4A3A4"/>
+          </p15:clr>
+        </p15:guide>
+        <p15:guide id="9" pos="219">
+          <p15:clr>
+            <a:srgbClr val="A4A3A4"/>
+          </p15:clr>
+        </p15:guide>
+        <p15:guide id="10" pos="5551">
+          <p15:clr>
+            <a:srgbClr val="A4A3A4"/>
+          </p15:clr>
+        </p15:guide>
+        <p15:guide id="11" pos="2879">
+          <p15:clr>
+            <a:srgbClr val="A4A3A4"/>
+          </p15:clr>
+        </p15:guide>
+        <p15:guide id="12" pos="1521">
+          <p15:clr>
+            <a:srgbClr val="A4A3A4"/>
+          </p15:clr>
+        </p15:guide>
+        <p15:guide id="13" pos="4218">
+          <p15:clr>
+            <a:srgbClr val="A4A3A4"/>
+          </p15:clr>
+        </p15:guide>
+      </p15:sldGuideLst>
+    </p:ext>
+    <p:ext uri="{2D200454-40CA-4A62-9FC3-DE9A4176ACB9}">
+      <p15:notesGuideLst xmlns:p15="http://schemas.microsoft.com/office/powerpoint/2012/main">
+        <p15:guide id="1" orient="horz" pos="3024">
+          <p15:clr>
+            <a:srgbClr val="A4A3A4"/>
+          </p15:clr>
+        </p15:guide>
+        <p15:guide id="2" orient="horz" pos="5906">
+          <p15:clr>
+            <a:srgbClr val="A4A3A4"/>
+          </p15:clr>
+        </p15:guide>
+        <p15:guide id="3" pos="2304">
+          <p15:clr>
+            <a:srgbClr val="A4A3A4"/>
+          </p15:clr>
+        </p15:guide>
+      </p15:notesGuideLst>
+    </p:ext>
+  </p:extLst>
 </p:presentation>
 </file>
 
@@ -524,35 +614,35 @@
           <a:p>
             <a:pPr lvl="0"/>
             <a:r>
-              <a:rPr lang="en-US" smtClean="0"/>
+              <a:rPr lang="en-US"/>
               <a:t>Click to edit Master text styles</a:t>
             </a:r>
           </a:p>
           <a:p>
             <a:pPr lvl="1"/>
             <a:r>
-              <a:rPr lang="en-US" smtClean="0"/>
+              <a:rPr lang="en-US"/>
               <a:t>Second level</a:t>
             </a:r>
           </a:p>
           <a:p>
             <a:pPr lvl="2"/>
             <a:r>
-              <a:rPr lang="en-US" smtClean="0"/>
+              <a:rPr lang="en-US"/>
               <a:t>Third level</a:t>
             </a:r>
           </a:p>
           <a:p>
             <a:pPr lvl="3"/>
             <a:r>
-              <a:rPr lang="en-US" smtClean="0"/>
+              <a:rPr lang="en-US"/>
               <a:t>Fourth level</a:t>
             </a:r>
           </a:p>
           <a:p>
             <a:pPr lvl="4"/>
             <a:r>
-              <a:rPr lang="en-US" smtClean="0"/>
+              <a:rPr lang="en-US"/>
               <a:t>Fifth level</a:t>
             </a:r>
           </a:p>
@@ -916,10 +1006,9 @@
           <a:p>
             <a:pPr lvl="0"/>
             <a:r>
-              <a:rPr lang="en-US" noProof="0" smtClean="0"/>
+              <a:rPr lang="en-US" noProof="0"/>
               <a:t>Click to edit Master title style</a:t>
             </a:r>
-            <a:endParaRPr lang="en-US" noProof="0" smtClean="0"/>
           </a:p>
         </p:txBody>
       </p:sp>
@@ -956,10 +1045,9 @@
           <a:p>
             <a:pPr lvl="0"/>
             <a:r>
-              <a:rPr lang="en-US" noProof="0" smtClean="0"/>
+              <a:rPr lang="en-US" noProof="0"/>
               <a:t>Click to edit Master subtitle style</a:t>
             </a:r>
-            <a:endParaRPr lang="en-US" noProof="0" smtClean="0"/>
           </a:p>
         </p:txBody>
       </p:sp>
@@ -1022,13 +1110,6 @@
   <p:clrMapOvr>
     <a:masterClrMapping/>
   </p:clrMapOvr>
-  <p:timing>
-    <p:tnLst>
-      <p:par>
-        <p:cTn id="1" dur="indefinite" restart="never" nodeType="tmRoot"/>
-      </p:par>
-    </p:tnLst>
-  </p:timing>
 </p:sldLayout>
 </file>
 
@@ -1086,14 +1167,14 @@
           </a:lstStyle>
           <a:p>
             <a:r>
-              <a:rPr lang="en-US" dirty="0" smtClean="0"/>
+              <a:rPr lang="en-US" dirty="0"/>
               <a:t>Click to edit Master </a:t>
             </a:r>
             <a:br>
-              <a:rPr lang="en-US" dirty="0" smtClean="0"/>
+              <a:rPr lang="en-US" dirty="0"/>
             </a:br>
             <a:r>
-              <a:rPr lang="en-US" dirty="0" smtClean="0"/>
+              <a:rPr lang="en-US" dirty="0"/>
               <a:t>title style</a:t>
             </a:r>
             <a:endParaRPr lang="en-GB" dirty="0"/>
@@ -1164,13 +1245,6 @@
   <p:clrMapOvr>
     <a:masterClrMapping/>
   </p:clrMapOvr>
-  <p:timing>
-    <p:tnLst>
-      <p:par>
-        <p:cTn id="1" dur="indefinite" restart="never" nodeType="tmRoot"/>
-      </p:par>
-    </p:tnLst>
-  </p:timing>
 </p:sldLayout>
 </file>
 
@@ -1228,14 +1302,14 @@
           </a:lstStyle>
           <a:p>
             <a:r>
-              <a:rPr lang="en-US" dirty="0" smtClean="0"/>
+              <a:rPr lang="en-US" dirty="0"/>
               <a:t>Click to edit Master </a:t>
             </a:r>
             <a:br>
-              <a:rPr lang="en-US" dirty="0" smtClean="0"/>
+              <a:rPr lang="en-US" dirty="0"/>
             </a:br>
             <a:r>
-              <a:rPr lang="en-US" dirty="0" smtClean="0"/>
+              <a:rPr lang="en-US" dirty="0"/>
               <a:t>title style</a:t>
             </a:r>
             <a:endParaRPr lang="en-GB" dirty="0"/>
@@ -1306,13 +1380,6 @@
   <p:clrMapOvr>
     <a:masterClrMapping/>
   </p:clrMapOvr>
-  <p:timing>
-    <p:tnLst>
-      <p:par>
-        <p:cTn id="1" dur="indefinite" restart="never" nodeType="tmRoot"/>
-      </p:par>
-    </p:tnLst>
-  </p:timing>
 </p:sldLayout>
 </file>
 
@@ -1370,14 +1437,14 @@
           </a:lstStyle>
           <a:p>
             <a:r>
-              <a:rPr lang="en-US" dirty="0" smtClean="0"/>
+              <a:rPr lang="en-US" dirty="0"/>
               <a:t>Click to edit Master </a:t>
             </a:r>
             <a:br>
-              <a:rPr lang="en-US" dirty="0" smtClean="0"/>
+              <a:rPr lang="en-US" dirty="0"/>
             </a:br>
             <a:r>
-              <a:rPr lang="en-US" dirty="0" smtClean="0"/>
+              <a:rPr lang="en-US" dirty="0"/>
               <a:t>title style</a:t>
             </a:r>
             <a:endParaRPr lang="en-GB" dirty="0"/>
@@ -1448,13 +1515,6 @@
   <p:clrMapOvr>
     <a:masterClrMapping/>
   </p:clrMapOvr>
-  <p:timing>
-    <p:tnLst>
-      <p:par>
-        <p:cTn id="1" dur="indefinite" restart="never" nodeType="tmRoot"/>
-      </p:par>
-    </p:tnLst>
-  </p:timing>
 </p:sldLayout>
 </file>
 
@@ -1512,14 +1572,14 @@
           </a:lstStyle>
           <a:p>
             <a:r>
-              <a:rPr lang="en-US" dirty="0" smtClean="0"/>
+              <a:rPr lang="en-US" dirty="0"/>
               <a:t>Click to edit Master </a:t>
             </a:r>
             <a:br>
-              <a:rPr lang="en-US" dirty="0" smtClean="0"/>
+              <a:rPr lang="en-US" dirty="0"/>
             </a:br>
             <a:r>
-              <a:rPr lang="en-US" dirty="0" smtClean="0"/>
+              <a:rPr lang="en-US" dirty="0"/>
               <a:t>title style</a:t>
             </a:r>
             <a:endParaRPr lang="en-GB" dirty="0"/>
@@ -1590,13 +1650,6 @@
   <p:clrMapOvr>
     <a:masterClrMapping/>
   </p:clrMapOvr>
-  <p:timing>
-    <p:tnLst>
-      <p:par>
-        <p:cTn id="1" dur="indefinite" restart="never" nodeType="tmRoot"/>
-      </p:par>
-    </p:tnLst>
-  </p:timing>
 </p:sldLayout>
 </file>
 
@@ -1708,14 +1761,14 @@
           </a:lstStyle>
           <a:p>
             <a:r>
-              <a:rPr lang="en-US" dirty="0" smtClean="0"/>
+              <a:rPr lang="en-US" dirty="0"/>
               <a:t>Click to edit Master </a:t>
             </a:r>
             <a:br>
-              <a:rPr lang="en-US" dirty="0" smtClean="0"/>
+              <a:rPr lang="en-US" dirty="0"/>
             </a:br>
             <a:r>
-              <a:rPr lang="en-US" dirty="0" smtClean="0"/>
+              <a:rPr lang="en-US" dirty="0"/>
               <a:t>title style</a:t>
             </a:r>
             <a:endParaRPr lang="en-GB" dirty="0"/>
@@ -1732,13 +1785,6 @@
   <p:clrMapOvr>
     <a:masterClrMapping/>
   </p:clrMapOvr>
-  <p:timing>
-    <p:tnLst>
-      <p:par>
-        <p:cTn id="1" dur="indefinite" restart="never" nodeType="tmRoot"/>
-      </p:par>
-    </p:tnLst>
-  </p:timing>
 </p:sldLayout>
 </file>
 
@@ -1810,13 +1856,6 @@
   <p:clrMapOvr>
     <a:masterClrMapping/>
   </p:clrMapOvr>
-  <p:timing>
-    <p:tnLst>
-      <p:par>
-        <p:cTn id="1" dur="indefinite" restart="never" nodeType="tmRoot"/>
-      </p:par>
-    </p:tnLst>
-  </p:timing>
 </p:sldLayout>
 </file>
 
@@ -1853,7 +1892,7 @@
           <a:lstStyle/>
           <a:p>
             <a:r>
-              <a:rPr lang="en-US" smtClean="0"/>
+              <a:rPr lang="en-US"/>
               <a:t>Click to edit Master title style</a:t>
             </a:r>
             <a:endParaRPr lang="en-GB"/>
@@ -1877,35 +1916,35 @@
           <a:p>
             <a:pPr lvl="0"/>
             <a:r>
-              <a:rPr lang="en-US" smtClean="0"/>
+              <a:rPr lang="en-US"/>
               <a:t>Click to edit Master text styles</a:t>
             </a:r>
           </a:p>
           <a:p>
             <a:pPr lvl="1"/>
             <a:r>
-              <a:rPr lang="en-US" smtClean="0"/>
+              <a:rPr lang="en-US"/>
               <a:t>Second level</a:t>
             </a:r>
           </a:p>
           <a:p>
             <a:pPr lvl="2"/>
             <a:r>
-              <a:rPr lang="en-US" smtClean="0"/>
+              <a:rPr lang="en-US"/>
               <a:t>Third level</a:t>
             </a:r>
           </a:p>
           <a:p>
             <a:pPr lvl="3"/>
             <a:r>
-              <a:rPr lang="en-US" smtClean="0"/>
+              <a:rPr lang="en-US"/>
               <a:t>Fourth level</a:t>
             </a:r>
           </a:p>
           <a:p>
             <a:pPr lvl="4"/>
             <a:r>
-              <a:rPr lang="en-US" smtClean="0"/>
+              <a:rPr lang="en-US"/>
               <a:t>Fifth level</a:t>
             </a:r>
             <a:endParaRPr lang="en-GB" dirty="0"/>
@@ -2048,10 +2087,9 @@
               </a:lnSpc>
             </a:pPr>
             <a:r>
-              <a:rPr lang="en-US" sz="900" dirty="0" smtClean="0"/>
+              <a:rPr lang="en-US" sz="900" dirty="0"/>
               <a:t>GE Title or job number</a:t>
             </a:r>
-            <a:endParaRPr lang="en-US" sz="900" dirty="0"/>
           </a:p>
           <a:p>
             <a:pPr algn="r">
@@ -2066,7 +2104,7 @@
                   <a:spcPct val="90000"/>
                 </a:lnSpc>
               </a:pPr>
-              <a:t>7/11/2017</a:t>
+              <a:t>2/11/2021</a:t>
             </a:fld>
             <a:endParaRPr lang="en-US" dirty="0"/>
           </a:p>
@@ -2082,13 +2120,6 @@
   <p:clrMapOvr>
     <a:masterClrMapping/>
   </p:clrMapOvr>
-  <p:timing>
-    <p:tnLst>
-      <p:par>
-        <p:cTn id="1" dur="indefinite" restart="never" nodeType="tmRoot"/>
-      </p:par>
-    </p:tnLst>
-  </p:timing>
 </p:sldLayout>
 </file>
 
@@ -2134,7 +2165,7 @@
           </a:lstStyle>
           <a:p>
             <a:r>
-              <a:rPr lang="en-US" smtClean="0"/>
+              <a:rPr lang="en-US"/>
               <a:t>Click to edit Master title style</a:t>
             </a:r>
             <a:endParaRPr lang="en-GB" dirty="0"/>
@@ -2182,35 +2213,35 @@
           <a:p>
             <a:pPr lvl="0"/>
             <a:r>
-              <a:rPr lang="en-US" smtClean="0"/>
+              <a:rPr lang="en-US"/>
               <a:t>Click to edit Master text styles</a:t>
             </a:r>
           </a:p>
           <a:p>
             <a:pPr lvl="1"/>
             <a:r>
-              <a:rPr lang="en-US" smtClean="0"/>
+              <a:rPr lang="en-US"/>
               <a:t>Second level</a:t>
             </a:r>
           </a:p>
           <a:p>
             <a:pPr lvl="2"/>
             <a:r>
-              <a:rPr lang="en-US" smtClean="0"/>
+              <a:rPr lang="en-US"/>
               <a:t>Third level</a:t>
             </a:r>
           </a:p>
           <a:p>
             <a:pPr lvl="3"/>
             <a:r>
-              <a:rPr lang="en-US" smtClean="0"/>
+              <a:rPr lang="en-US"/>
               <a:t>Fourth level</a:t>
             </a:r>
           </a:p>
           <a:p>
             <a:pPr lvl="4"/>
             <a:r>
-              <a:rPr lang="en-US" smtClean="0"/>
+              <a:rPr lang="en-US"/>
               <a:t>Fifth level</a:t>
             </a:r>
             <a:endParaRPr lang="en-GB" dirty="0"/>
@@ -2370,7 +2401,7 @@
                   <a:spcPct val="90000"/>
                 </a:lnSpc>
               </a:pPr>
-              <a:t>7/11/2017</a:t>
+              <a:t>2/11/2021</a:t>
             </a:fld>
             <a:endParaRPr lang="en-US" dirty="0"/>
           </a:p>
@@ -2386,13 +2417,6 @@
   <p:clrMapOvr>
     <a:masterClrMapping/>
   </p:clrMapOvr>
-  <p:timing>
-    <p:tnLst>
-      <p:par>
-        <p:cTn id="1" dur="indefinite" restart="never" nodeType="tmRoot"/>
-      </p:par>
-    </p:tnLst>
-  </p:timing>
 </p:sldLayout>
 </file>
 
@@ -2429,7 +2453,7 @@
           <a:lstStyle/>
           <a:p>
             <a:r>
-              <a:rPr lang="en-US" smtClean="0"/>
+              <a:rPr lang="en-US"/>
               <a:t>Click to edit Master title style</a:t>
             </a:r>
             <a:endParaRPr lang="en-GB" dirty="0"/>
@@ -2486,35 +2510,35 @@
           <a:p>
             <a:pPr lvl="0"/>
             <a:r>
-              <a:rPr lang="en-US" smtClean="0"/>
+              <a:rPr lang="en-US"/>
               <a:t>Click to edit Master text styles</a:t>
             </a:r>
           </a:p>
           <a:p>
             <a:pPr lvl="1"/>
             <a:r>
-              <a:rPr lang="en-US" smtClean="0"/>
+              <a:rPr lang="en-US"/>
               <a:t>Second level</a:t>
             </a:r>
           </a:p>
           <a:p>
             <a:pPr lvl="2"/>
             <a:r>
-              <a:rPr lang="en-US" smtClean="0"/>
+              <a:rPr lang="en-US"/>
               <a:t>Third level</a:t>
             </a:r>
           </a:p>
           <a:p>
             <a:pPr lvl="3"/>
             <a:r>
-              <a:rPr lang="en-US" smtClean="0"/>
+              <a:rPr lang="en-US"/>
               <a:t>Fourth level</a:t>
             </a:r>
           </a:p>
           <a:p>
             <a:pPr lvl="4"/>
             <a:r>
-              <a:rPr lang="en-US" smtClean="0"/>
+              <a:rPr lang="en-US"/>
               <a:t>Fifth level</a:t>
             </a:r>
             <a:endParaRPr lang="en-GB" dirty="0"/>
@@ -2571,35 +2595,35 @@
           <a:p>
             <a:pPr lvl="0"/>
             <a:r>
-              <a:rPr lang="en-US" smtClean="0"/>
+              <a:rPr lang="en-US"/>
               <a:t>Click to edit Master text styles</a:t>
             </a:r>
           </a:p>
           <a:p>
             <a:pPr lvl="1"/>
             <a:r>
-              <a:rPr lang="en-US" smtClean="0"/>
+              <a:rPr lang="en-US"/>
               <a:t>Second level</a:t>
             </a:r>
           </a:p>
           <a:p>
             <a:pPr lvl="2"/>
             <a:r>
-              <a:rPr lang="en-US" smtClean="0"/>
+              <a:rPr lang="en-US"/>
               <a:t>Third level</a:t>
             </a:r>
           </a:p>
           <a:p>
             <a:pPr lvl="3"/>
             <a:r>
-              <a:rPr lang="en-US" smtClean="0"/>
+              <a:rPr lang="en-US"/>
               <a:t>Fourth level</a:t>
             </a:r>
           </a:p>
           <a:p>
             <a:pPr lvl="4"/>
             <a:r>
-              <a:rPr lang="en-US" smtClean="0"/>
+              <a:rPr lang="en-US"/>
               <a:t>Fifth level</a:t>
             </a:r>
             <a:endParaRPr lang="en-GB" dirty="0"/>
@@ -2759,7 +2783,7 @@
                   <a:spcPct val="90000"/>
                 </a:lnSpc>
               </a:pPr>
-              <a:t>7/11/2017</a:t>
+              <a:t>2/11/2021</a:t>
             </a:fld>
             <a:endParaRPr lang="en-US" dirty="0"/>
           </a:p>
@@ -2775,13 +2799,6 @@
   <p:clrMapOvr>
     <a:masterClrMapping/>
   </p:clrMapOvr>
-  <p:timing>
-    <p:tnLst>
-      <p:par>
-        <p:cTn id="1" dur="indefinite" restart="never" nodeType="tmRoot"/>
-      </p:par>
-    </p:tnLst>
-  </p:timing>
 </p:sldLayout>
 </file>
 
@@ -2818,7 +2835,7 @@
           <a:lstStyle/>
           <a:p>
             <a:r>
-              <a:rPr lang="en-US" smtClean="0"/>
+              <a:rPr lang="en-US"/>
               <a:t>Click to edit Master title style</a:t>
             </a:r>
             <a:endParaRPr lang="en-GB" dirty="0"/>
@@ -2875,35 +2892,35 @@
           <a:p>
             <a:pPr lvl="0"/>
             <a:r>
-              <a:rPr lang="en-US" smtClean="0"/>
+              <a:rPr lang="en-US"/>
               <a:t>Click to edit Master text styles</a:t>
             </a:r>
           </a:p>
           <a:p>
             <a:pPr lvl="1"/>
             <a:r>
-              <a:rPr lang="en-US" smtClean="0"/>
+              <a:rPr lang="en-US"/>
               <a:t>Second level</a:t>
             </a:r>
           </a:p>
           <a:p>
             <a:pPr lvl="2"/>
             <a:r>
-              <a:rPr lang="en-US" smtClean="0"/>
+              <a:rPr lang="en-US"/>
               <a:t>Third level</a:t>
             </a:r>
           </a:p>
           <a:p>
             <a:pPr lvl="3"/>
             <a:r>
-              <a:rPr lang="en-US" smtClean="0"/>
+              <a:rPr lang="en-US"/>
               <a:t>Fourth level</a:t>
             </a:r>
           </a:p>
           <a:p>
             <a:pPr lvl="4"/>
             <a:r>
-              <a:rPr lang="en-US" smtClean="0"/>
+              <a:rPr lang="en-US"/>
               <a:t>Fifth level</a:t>
             </a:r>
             <a:endParaRPr lang="en-GB" dirty="0"/>
@@ -3014,35 +3031,35 @@
           <a:p>
             <a:pPr lvl="0"/>
             <a:r>
-              <a:rPr lang="en-US" smtClean="0"/>
+              <a:rPr lang="en-US"/>
               <a:t>Click to edit Master text styles</a:t>
             </a:r>
           </a:p>
           <a:p>
             <a:pPr lvl="1"/>
             <a:r>
-              <a:rPr lang="en-US" smtClean="0"/>
+              <a:rPr lang="en-US"/>
               <a:t>Second level</a:t>
             </a:r>
           </a:p>
           <a:p>
             <a:pPr lvl="2"/>
             <a:r>
-              <a:rPr lang="en-US" smtClean="0"/>
+              <a:rPr lang="en-US"/>
               <a:t>Third level</a:t>
             </a:r>
           </a:p>
           <a:p>
             <a:pPr lvl="3"/>
             <a:r>
-              <a:rPr lang="en-US" smtClean="0"/>
+              <a:rPr lang="en-US"/>
               <a:t>Fourth level</a:t>
             </a:r>
           </a:p>
           <a:p>
             <a:pPr lvl="4"/>
             <a:r>
-              <a:rPr lang="en-US" smtClean="0"/>
+              <a:rPr lang="en-US"/>
               <a:t>Fifth level</a:t>
             </a:r>
             <a:endParaRPr lang="en-GB" dirty="0"/>
@@ -3099,35 +3116,35 @@
           <a:p>
             <a:pPr lvl="0"/>
             <a:r>
-              <a:rPr lang="en-US" smtClean="0"/>
+              <a:rPr lang="en-US"/>
               <a:t>Click to edit Master text styles</a:t>
             </a:r>
           </a:p>
           <a:p>
             <a:pPr lvl="1"/>
             <a:r>
-              <a:rPr lang="en-US" smtClean="0"/>
+              <a:rPr lang="en-US"/>
               <a:t>Second level</a:t>
             </a:r>
           </a:p>
           <a:p>
             <a:pPr lvl="2"/>
             <a:r>
-              <a:rPr lang="en-US" smtClean="0"/>
+              <a:rPr lang="en-US"/>
               <a:t>Third level</a:t>
             </a:r>
           </a:p>
           <a:p>
             <a:pPr lvl="3"/>
             <a:r>
-              <a:rPr lang="en-US" smtClean="0"/>
+              <a:rPr lang="en-US"/>
               <a:t>Fourth level</a:t>
             </a:r>
           </a:p>
           <a:p>
             <a:pPr lvl="4"/>
             <a:r>
-              <a:rPr lang="en-US" smtClean="0"/>
+              <a:rPr lang="en-US"/>
               <a:t>Fifth level</a:t>
             </a:r>
             <a:endParaRPr lang="en-GB" dirty="0"/>
@@ -3233,7 +3250,7 @@
                   <a:spcPct val="90000"/>
                 </a:lnSpc>
               </a:pPr>
-              <a:t>7/11/2017</a:t>
+              <a:t>2/11/2021</a:t>
             </a:fld>
             <a:endParaRPr lang="en-US" dirty="0"/>
           </a:p>
@@ -3249,13 +3266,6 @@
   <p:clrMapOvr>
     <a:masterClrMapping/>
   </p:clrMapOvr>
-  <p:timing>
-    <p:tnLst>
-      <p:par>
-        <p:cTn id="1" dur="indefinite" restart="never" nodeType="tmRoot"/>
-      </p:par>
-    </p:tnLst>
-  </p:timing>
 </p:sldLayout>
 </file>
 
@@ -3335,7 +3345,7 @@
           <a:p>
             <a:pPr lvl="0"/>
             <a:r>
-              <a:rPr lang="en-US" smtClean="0"/>
+              <a:rPr lang="en-US"/>
               <a:t>Click to edit Master text styles</a:t>
             </a:r>
           </a:p>
@@ -3391,35 +3401,35 @@
           <a:p>
             <a:pPr lvl="0"/>
             <a:r>
-              <a:rPr lang="en-US" smtClean="0"/>
+              <a:rPr lang="en-US"/>
               <a:t>Click to edit Master text styles</a:t>
             </a:r>
           </a:p>
           <a:p>
             <a:pPr lvl="1"/>
             <a:r>
-              <a:rPr lang="en-US" smtClean="0"/>
+              <a:rPr lang="en-US"/>
               <a:t>Second level</a:t>
             </a:r>
           </a:p>
           <a:p>
             <a:pPr lvl="2"/>
             <a:r>
-              <a:rPr lang="en-US" smtClean="0"/>
+              <a:rPr lang="en-US"/>
               <a:t>Third level</a:t>
             </a:r>
           </a:p>
           <a:p>
             <a:pPr lvl="3"/>
             <a:r>
-              <a:rPr lang="en-US" smtClean="0"/>
+              <a:rPr lang="en-US"/>
               <a:t>Fourth level</a:t>
             </a:r>
           </a:p>
           <a:p>
             <a:pPr lvl="4"/>
             <a:r>
-              <a:rPr lang="en-US" smtClean="0"/>
+              <a:rPr lang="en-US"/>
               <a:t>Fifth level</a:t>
             </a:r>
             <a:endParaRPr lang="en-GB" dirty="0"/>
@@ -3485,7 +3495,7 @@
           <a:p>
             <a:pPr lvl="0"/>
             <a:r>
-              <a:rPr lang="en-US" smtClean="0"/>
+              <a:rPr lang="en-US"/>
               <a:t>Click to edit Master text styles</a:t>
             </a:r>
           </a:p>
@@ -3541,35 +3551,35 @@
           <a:p>
             <a:pPr lvl="0"/>
             <a:r>
-              <a:rPr lang="en-US" smtClean="0"/>
+              <a:rPr lang="en-US"/>
               <a:t>Click to edit Master text styles</a:t>
             </a:r>
           </a:p>
           <a:p>
             <a:pPr lvl="1"/>
             <a:r>
-              <a:rPr lang="en-US" smtClean="0"/>
+              <a:rPr lang="en-US"/>
               <a:t>Second level</a:t>
             </a:r>
           </a:p>
           <a:p>
             <a:pPr lvl="2"/>
             <a:r>
-              <a:rPr lang="en-US" smtClean="0"/>
+              <a:rPr lang="en-US"/>
               <a:t>Third level</a:t>
             </a:r>
           </a:p>
           <a:p>
             <a:pPr lvl="3"/>
             <a:r>
-              <a:rPr lang="en-US" smtClean="0"/>
+              <a:rPr lang="en-US"/>
               <a:t>Fourth level</a:t>
             </a:r>
           </a:p>
           <a:p>
             <a:pPr lvl="4"/>
             <a:r>
-              <a:rPr lang="en-US" smtClean="0"/>
+              <a:rPr lang="en-US"/>
               <a:t>Fifth level</a:t>
             </a:r>
             <a:endParaRPr lang="en-GB"/>
@@ -3651,7 +3661,7 @@
           <a:lstStyle/>
           <a:p>
             <a:r>
-              <a:rPr lang="en-US" smtClean="0"/>
+              <a:rPr lang="en-US"/>
               <a:t>Click to edit Master title style</a:t>
             </a:r>
             <a:endParaRPr lang="en-GB" dirty="0"/>
@@ -3757,7 +3767,7 @@
                   <a:spcPct val="90000"/>
                 </a:lnSpc>
               </a:pPr>
-              <a:t>7/11/2017</a:t>
+              <a:t>2/11/2021</a:t>
             </a:fld>
             <a:endParaRPr lang="en-US" dirty="0"/>
           </a:p>
@@ -3773,13 +3783,6 @@
   <p:clrMapOvr>
     <a:masterClrMapping/>
   </p:clrMapOvr>
-  <p:timing>
-    <p:tnLst>
-      <p:par>
-        <p:cTn id="1" dur="indefinite" restart="never" nodeType="tmRoot"/>
-      </p:par>
-    </p:tnLst>
-  </p:timing>
 </p:sldLayout>
 </file>
 
@@ -3816,7 +3819,7 @@
           <a:lstStyle/>
           <a:p>
             <a:r>
-              <a:rPr lang="en-US" smtClean="0"/>
+              <a:rPr lang="en-US"/>
               <a:t>Click to edit Master title style</a:t>
             </a:r>
             <a:endParaRPr lang="en-GB"/>
@@ -3976,7 +3979,7 @@
                   <a:spcPct val="90000"/>
                 </a:lnSpc>
               </a:pPr>
-              <a:t>7/11/2017</a:t>
+              <a:t>2/11/2021</a:t>
             </a:fld>
             <a:endParaRPr lang="en-US" dirty="0"/>
           </a:p>
@@ -3992,13 +3995,6 @@
   <p:clrMapOvr>
     <a:masterClrMapping/>
   </p:clrMapOvr>
-  <p:timing>
-    <p:tnLst>
-      <p:par>
-        <p:cTn id="1" dur="indefinite" restart="never" nodeType="tmRoot"/>
-      </p:par>
-    </p:tnLst>
-  </p:timing>
 </p:sldLayout>
 </file>
 
@@ -4056,14 +4052,14 @@
           </a:lstStyle>
           <a:p>
             <a:r>
-              <a:rPr lang="en-US" dirty="0" smtClean="0"/>
+              <a:rPr lang="en-US" dirty="0"/>
               <a:t>Click to edit Master </a:t>
             </a:r>
             <a:br>
-              <a:rPr lang="en-US" dirty="0" smtClean="0"/>
+              <a:rPr lang="en-US" dirty="0"/>
             </a:br>
             <a:r>
-              <a:rPr lang="en-US" dirty="0" smtClean="0"/>
+              <a:rPr lang="en-US" dirty="0"/>
               <a:t>title style</a:t>
             </a:r>
             <a:endParaRPr lang="en-GB" dirty="0"/>
@@ -4134,13 +4130,6 @@
   <p:clrMapOvr>
     <a:masterClrMapping/>
   </p:clrMapOvr>
-  <p:timing>
-    <p:tnLst>
-      <p:par>
-        <p:cTn id="1" dur="indefinite" restart="never" nodeType="tmRoot"/>
-      </p:par>
-    </p:tnLst>
-  </p:timing>
 </p:sldLayout>
 </file>
 
@@ -4198,14 +4187,14 @@
           </a:lstStyle>
           <a:p>
             <a:r>
-              <a:rPr lang="en-US" dirty="0" smtClean="0"/>
+              <a:rPr lang="en-US" dirty="0"/>
               <a:t>Click to edit Master </a:t>
             </a:r>
             <a:br>
-              <a:rPr lang="en-US" dirty="0" smtClean="0"/>
+              <a:rPr lang="en-US" dirty="0"/>
             </a:br>
             <a:r>
-              <a:rPr lang="en-US" dirty="0" smtClean="0"/>
+              <a:rPr lang="en-US" dirty="0"/>
               <a:t>title style</a:t>
             </a:r>
             <a:endParaRPr lang="en-GB" dirty="0"/>
@@ -4276,13 +4265,6 @@
   <p:clrMapOvr>
     <a:masterClrMapping/>
   </p:clrMapOvr>
-  <p:timing>
-    <p:tnLst>
-      <p:par>
-        <p:cTn id="1" dur="indefinite" restart="never" nodeType="tmRoot"/>
-      </p:par>
-    </p:tnLst>
-  </p:timing>
 </p:sldLayout>
 </file>
 
@@ -4373,10 +4355,9 @@
           <a:p>
             <a:pPr lvl="0"/>
             <a:r>
-              <a:rPr lang="en-US" smtClean="0"/>
+              <a:rPr lang="en-US"/>
               <a:t>Click to edit Master title style</a:t>
             </a:r>
-            <a:endParaRPr lang="en-US" smtClean="0"/>
           </a:p>
         </p:txBody>
       </p:sp>
@@ -4442,38 +4423,38 @@
           <a:p>
             <a:pPr lvl="0"/>
             <a:r>
-              <a:rPr lang="en-US" smtClean="0"/>
+              <a:rPr lang="en-US"/>
               <a:t>Click to edit Master text styles</a:t>
             </a:r>
           </a:p>
           <a:p>
             <a:pPr lvl="1"/>
             <a:r>
-              <a:rPr lang="en-US" smtClean="0"/>
+              <a:rPr lang="en-US"/>
               <a:t>Second level</a:t>
             </a:r>
           </a:p>
           <a:p>
             <a:pPr lvl="2"/>
             <a:r>
-              <a:rPr lang="en-US" smtClean="0"/>
+              <a:rPr lang="en-US"/>
               <a:t>Third level</a:t>
             </a:r>
           </a:p>
           <a:p>
             <a:pPr lvl="3"/>
             <a:r>
-              <a:rPr lang="en-US" smtClean="0"/>
+              <a:rPr lang="en-US"/>
               <a:t>Fourth level</a:t>
             </a:r>
           </a:p>
           <a:p>
             <a:pPr lvl="4"/>
             <a:r>
-              <a:rPr lang="en-US" smtClean="0"/>
+              <a:rPr lang="en-US"/>
               <a:t>Fifth level</a:t>
             </a:r>
-            <a:endParaRPr lang="en-US" dirty="0" smtClean="0"/>
+            <a:endParaRPr lang="en-US" dirty="0"/>
           </a:p>
         </p:txBody>
       </p:sp>
@@ -4497,13 +4478,6 @@
     <p:sldLayoutId id="2147483678" r:id="rId14"/>
     <p:sldLayoutId id="2147483680" r:id="rId15"/>
   </p:sldLayoutIdLst>
-  <p:timing>
-    <p:tnLst>
-      <p:par>
-        <p:cTn id="1" dur="indefinite" restart="never" nodeType="tmRoot"/>
-      </p:par>
-    </p:tnLst>
-  </p:timing>
   <p:hf sldNum="0" hdr="0" dt="0"/>
   <p:txStyles>
     <p:titleStyle>
@@ -5125,42 +5099,112 @@
           <a:lstStyle/>
           <a:p>
             <a:r>
-              <a:rPr lang="en-US" sz="2400" dirty="0" smtClean="0"/>
+              <a:rPr lang="en-US" sz="2400" dirty="0"/>
               <a:t>Station 2 Yokogawa IP address:</a:t>
             </a:r>
           </a:p>
           <a:p>
             <a:r>
-              <a:rPr lang="en-US" sz="2400" dirty="0" smtClean="0"/>
-              <a:t>IP: 10.0.3.183</a:t>
-            </a:r>
-          </a:p>
-          <a:p>
-            <a:r>
-              <a:rPr lang="en-US" sz="2400" dirty="0" smtClean="0"/>
+              <a:rPr lang="en-US" sz="2400" dirty="0"/>
+              <a:t>IP: 10.2.0.151</a:t>
+            </a:r>
+          </a:p>
+          <a:p>
+            <a:r>
+              <a:rPr lang="en-US" sz="2400" dirty="0"/>
               <a:t>Subnet: 255.255.255.0</a:t>
             </a:r>
           </a:p>
           <a:p>
             <a:r>
-              <a:rPr lang="en-US" sz="2400" dirty="0" smtClean="0"/>
-              <a:t>Gateway: 10.0.3.1</a:t>
+              <a:rPr lang="en-US" sz="2400" dirty="0"/>
+              <a:t>Gateway: 10.2.0.1</a:t>
             </a:r>
           </a:p>
         </p:txBody>
       </p:sp>
+      <p:sp>
+        <p:nvSpPr>
+          <p:cNvPr id="8" name="TextBox 7">
+            <a:extLst>
+              <a:ext uri="{FF2B5EF4-FFF2-40B4-BE49-F238E27FC236}">
+                <a16:creationId xmlns:a16="http://schemas.microsoft.com/office/drawing/2014/main" id="{797461B2-B2DA-49B0-AAFD-0DF8D7907B57}"/>
+              </a:ext>
+            </a:extLst>
+          </p:cNvPr>
+          <p:cNvSpPr txBox="1"/>
+          <p:nvPr/>
+        </p:nvSpPr>
+        <p:spPr>
+          <a:xfrm>
+            <a:off x="5926861" y="3891064"/>
+            <a:ext cx="1816357" cy="461665"/>
+          </a:xfrm>
+          <a:prstGeom prst="rect">
+            <a:avLst/>
+          </a:prstGeom>
+          <a:noFill/>
+        </p:spPr>
+        <p:txBody>
+          <a:bodyPr wrap="square" rtlCol="0">
+            <a:spAutoFit/>
+          </a:bodyPr>
+          <a:lstStyle/>
+          <a:p>
+            <a:r>
+              <a:rPr lang="en-US" sz="2400" dirty="0"/>
+              <a:t>DHCP = OFF</a:t>
+            </a:r>
+          </a:p>
+        </p:txBody>
+      </p:sp>
+      <p:cxnSp>
+        <p:nvCxnSpPr>
+          <p:cNvPr id="9" name="Straight Arrow Connector 8">
+            <a:extLst>
+              <a:ext uri="{FF2B5EF4-FFF2-40B4-BE49-F238E27FC236}">
+                <a16:creationId xmlns:a16="http://schemas.microsoft.com/office/drawing/2014/main" id="{933E1551-B1FC-4F4D-8D0C-ED352D46364A}"/>
+              </a:ext>
+            </a:extLst>
+          </p:cNvPr>
+          <p:cNvCxnSpPr>
+            <a:cxnSpLocks/>
+            <a:stCxn id="8" idx="0"/>
+          </p:cNvCxnSpPr>
+          <p:nvPr/>
+        </p:nvCxnSpPr>
+        <p:spPr>
+          <a:xfrm flipH="1" flipV="1">
+            <a:off x="5390708" y="2213046"/>
+            <a:ext cx="1444332" cy="1678018"/>
+          </a:xfrm>
+          <a:prstGeom prst="straightConnector1">
+            <a:avLst/>
+          </a:prstGeom>
+          <a:ln>
+            <a:tailEnd type="arrow"/>
+          </a:ln>
+        </p:spPr>
+        <p:style>
+          <a:lnRef idx="1">
+            <a:schemeClr val="accent1"/>
+          </a:lnRef>
+          <a:fillRef idx="0">
+            <a:schemeClr val="accent1"/>
+          </a:fillRef>
+          <a:effectRef idx="0">
+            <a:schemeClr val="accent1"/>
+          </a:effectRef>
+          <a:fontRef idx="minor">
+            <a:schemeClr val="tx1"/>
+          </a:fontRef>
+        </p:style>
+      </p:cxnSp>
     </p:spTree>
   </p:cSld>
   <p:clrMapOvr>
     <a:masterClrMapping/>
   </p:clrMapOvr>
-  <p:timing>
-    <p:tnLst>
-      <p:par>
-        <p:cTn id="1" dur="indefinite" restart="never" nodeType="tmRoot"/>
-      </p:par>
-    </p:tnLst>
-  </p:timing>
 </p:sld>
 </file>
 

</xml_diff>

<commit_message>
Updating flow meter zero for Emerson
</commit_message>
<xml_diff>
--- a/NI-2010/Drivers/Yokogawa WT300 Series/Documentation/Set IP.pptx
+++ b/NI-2010/Drivers/Yokogawa WT300 Series/Documentation/Set IP.pptx
@@ -5,13 +5,14 @@
     <p:sldMasterId id="2147483664" r:id="rId1"/>
   </p:sldMasterIdLst>
   <p:notesMasterIdLst>
-    <p:notesMasterId r:id="rId3"/>
+    <p:notesMasterId r:id="rId4"/>
   </p:notesMasterIdLst>
   <p:handoutMasterIdLst>
-    <p:handoutMasterId r:id="rId4"/>
+    <p:handoutMasterId r:id="rId5"/>
   </p:handoutMasterIdLst>
   <p:sldIdLst>
     <p:sldId id="286" r:id="rId2"/>
+    <p:sldId id="287" r:id="rId3"/>
   </p:sldIdLst>
   <p:sldSz cx="9144000" cy="6858000" type="screen4x3"/>
   <p:notesSz cx="7315200" cy="9601200"/>
@@ -2104,7 +2105,7 @@
                   <a:spcPct val="90000"/>
                 </a:lnSpc>
               </a:pPr>
-              <a:t>2/11/2021</a:t>
+              <a:t>8/30/2021</a:t>
             </a:fld>
             <a:endParaRPr lang="en-US" dirty="0"/>
           </a:p>
@@ -2401,7 +2402,7 @@
                   <a:spcPct val="90000"/>
                 </a:lnSpc>
               </a:pPr>
-              <a:t>2/11/2021</a:t>
+              <a:t>8/30/2021</a:t>
             </a:fld>
             <a:endParaRPr lang="en-US" dirty="0"/>
           </a:p>
@@ -2783,7 +2784,7 @@
                   <a:spcPct val="90000"/>
                 </a:lnSpc>
               </a:pPr>
-              <a:t>2/11/2021</a:t>
+              <a:t>8/30/2021</a:t>
             </a:fld>
             <a:endParaRPr lang="en-US" dirty="0"/>
           </a:p>
@@ -3250,7 +3251,7 @@
                   <a:spcPct val="90000"/>
                 </a:lnSpc>
               </a:pPr>
-              <a:t>2/11/2021</a:t>
+              <a:t>8/30/2021</a:t>
             </a:fld>
             <a:endParaRPr lang="en-US" dirty="0"/>
           </a:p>
@@ -3767,7 +3768,7 @@
                   <a:spcPct val="90000"/>
                 </a:lnSpc>
               </a:pPr>
-              <a:t>2/11/2021</a:t>
+              <a:t>8/30/2021</a:t>
             </a:fld>
             <a:endParaRPr lang="en-US" dirty="0"/>
           </a:p>
@@ -3979,7 +3980,7 @@
                   <a:spcPct val="90000"/>
                 </a:lnSpc>
               </a:pPr>
-              <a:t>2/11/2021</a:t>
+              <a:t>8/30/2021</a:t>
             </a:fld>
             <a:endParaRPr lang="en-US" dirty="0"/>
           </a:p>
@@ -5084,8 +5085,8 @@
         </p:nvSpPr>
         <p:spPr>
           <a:xfrm>
-            <a:off x="1439693" y="3881337"/>
-            <a:ext cx="4980562" cy="1569660"/>
+            <a:off x="1439692" y="3881337"/>
+            <a:ext cx="5395347" cy="1938992"/>
           </a:xfrm>
           <a:prstGeom prst="rect">
             <a:avLst/>
@@ -5112,14 +5113,17 @@
           <a:p>
             <a:r>
               <a:rPr lang="en-US" sz="2400" dirty="0"/>
-              <a:t>Subnet: 255.255.255.0</a:t>
+              <a:t>Subnet: 255.255.255.0 (Always the same)</a:t>
             </a:r>
           </a:p>
           <a:p>
             <a:r>
               <a:rPr lang="en-US" sz="2400" dirty="0"/>
-              <a:t>Gateway: 10.2.0.1</a:t>
-            </a:r>
+              <a:t>Gateway: 10.2.0.1 (Always the same)</a:t>
+            </a:r>
+          </a:p>
+          <a:p>
+            <a:endParaRPr lang="en-US" sz="2400" dirty="0"/>
           </a:p>
         </p:txBody>
       </p:sp>
@@ -5201,6 +5205,66 @@
         </p:style>
       </p:cxnSp>
     </p:spTree>
+  </p:cSld>
+  <p:clrMapOvr>
+    <a:masterClrMapping/>
+  </p:clrMapOvr>
+</p:sld>
+</file>
+
+<file path=ppt/slides/slide2.xml><?xml version="1.0" encoding="utf-8"?>
+<p:sld xmlns:a="http://schemas.openxmlformats.org/drawingml/2006/main" xmlns:r="http://schemas.openxmlformats.org/officeDocument/2006/relationships" xmlns:p="http://schemas.openxmlformats.org/presentationml/2006/main">
+  <p:cSld>
+    <p:spTree>
+      <p:nvGrpSpPr>
+        <p:cNvPr id="1" name=""/>
+        <p:cNvGrpSpPr/>
+        <p:nvPr/>
+      </p:nvGrpSpPr>
+      <p:grpSpPr>
+        <a:xfrm>
+          <a:off x="0" y="0"/>
+          <a:ext cx="0" cy="0"/>
+          <a:chOff x="0" y="0"/>
+          <a:chExt cx="0" cy="0"/>
+        </a:xfrm>
+      </p:grpSpPr>
+      <p:pic>
+        <p:nvPicPr>
+          <p:cNvPr id="5" name="Picture 4">
+            <a:extLst>
+              <a:ext uri="{FF2B5EF4-FFF2-40B4-BE49-F238E27FC236}">
+                <a16:creationId xmlns:a16="http://schemas.microsoft.com/office/drawing/2014/main" id="{88730CAE-8863-4959-AB38-90EF9FA6AC43}"/>
+              </a:ext>
+            </a:extLst>
+          </p:cNvPr>
+          <p:cNvPicPr>
+            <a:picLocks noChangeAspect="1"/>
+          </p:cNvPicPr>
+          <p:nvPr/>
+        </p:nvPicPr>
+        <p:blipFill>
+          <a:blip r:embed="rId2"/>
+          <a:stretch>
+            <a:fillRect/>
+          </a:stretch>
+        </p:blipFill>
+        <p:spPr>
+          <a:xfrm>
+            <a:off x="190610" y="549680"/>
+            <a:ext cx="9039225" cy="5248275"/>
+          </a:xfrm>
+          <a:prstGeom prst="rect">
+            <a:avLst/>
+          </a:prstGeom>
+        </p:spPr>
+      </p:pic>
+    </p:spTree>
+    <p:extLst>
+      <p:ext uri="{BB962C8B-B14F-4D97-AF65-F5344CB8AC3E}">
+        <p14:creationId xmlns:p14="http://schemas.microsoft.com/office/powerpoint/2010/main" val="828373285"/>
+      </p:ext>
+    </p:extLst>
   </p:cSld>
   <p:clrMapOvr>
     <a:masterClrMapping/>

</xml_diff>